<commit_message>
Added slides. Improved descriptions. Centered cards.
</commit_message>
<xml_diff>
--- a/public/download/slides-louvor-fundo-preto-16x9.pptx
+++ b/public/download/slides-louvor-fundo-preto-16x9.pptx
@@ -3290,16 +3290,8 @@
           <a:lstStyle/>
           <a:p>
             <a:r>
-              <a:rPr lang="pt-BR" dirty="0"/>
-              <a:t>M</a:t>
-            </a:r>
-            <a:r>
-              <a:rPr lang="en-US" dirty="0" err="1"/>
-              <a:t>úsica</a:t>
-            </a:r>
-            <a:r>
-              <a:rPr lang="en-US" dirty="0"/>
-              <a:t> 1</a:t>
+              <a:rPr lang="en-US" dirty="0"/>
+              <a:t>Música 1</a:t>
             </a:r>
           </a:p>
         </p:txBody>

</xml_diff>